<commit_message>
update bgp as numbers
</commit_message>
<xml_diff>
--- a/documentation/Arista ATD.pptx
+++ b/documentation/Arista ATD.pptx
@@ -3675,7 +3675,7 @@
           <a:p>
             <a:fld id="{566F7C18-64F0-4F8B-A614-678A9B42EDF3}" type="datetimeFigureOut">
               <a:rPr lang="en-US" smtClean="0"/>
-              <a:t>12/5/18</a:t>
+              <a:t>12/6/18</a:t>
             </a:fld>
             <a:endParaRPr lang="en-US"/>
           </a:p>
@@ -3840,7 +3840,7 @@
           <a:p>
             <a:fld id="{1D212D27-25C2-456C-B003-433D0C243240}" type="datetimeFigureOut">
               <a:rPr lang="en-US" smtClean="0"/>
-              <a:t>12/5/18</a:t>
+              <a:t>12/6/18</a:t>
             </a:fld>
             <a:endParaRPr lang="en-US"/>
           </a:p>
@@ -9122,11 +9122,11 @@
   <p:clrMapOvr>
     <a:masterClrMapping/>
   </p:clrMapOvr>
-  <mc:AlternateContent xmlns:mc="http://schemas.openxmlformats.org/markup-compatibility/2006">
-    <mc:Choice xmlns:p14="http://schemas.microsoft.com/office/powerpoint/2010/main" Requires="p14">
+  <mc:AlternateContent xmlns:mc="http://schemas.openxmlformats.org/markup-compatibility/2006" xmlns:p14="http://schemas.microsoft.com/office/powerpoint/2010/main">
+    <mc:Choice Requires="p14">
       <p:transition spd="slow" p14:dur="2000" advTm="3000"/>
     </mc:Choice>
-    <mc:Fallback>
+    <mc:Fallback xmlns="">
       <p:transition spd="slow" advTm="3000"/>
     </mc:Fallback>
   </mc:AlternateContent>
@@ -9270,11 +9270,11 @@
   <p:clrMapOvr>
     <a:masterClrMapping/>
   </p:clrMapOvr>
-  <mc:AlternateContent xmlns:mc="http://schemas.openxmlformats.org/markup-compatibility/2006">
-    <mc:Choice xmlns:p14="http://schemas.microsoft.com/office/powerpoint/2010/main" Requires="p14">
+  <mc:AlternateContent xmlns:mc="http://schemas.openxmlformats.org/markup-compatibility/2006" xmlns:p14="http://schemas.microsoft.com/office/powerpoint/2010/main">
+    <mc:Choice Requires="p14">
       <p:transition spd="slow" p14:dur="2000" advTm="3000"/>
     </mc:Choice>
-    <mc:Fallback>
+    <mc:Fallback xmlns="">
       <p:transition spd="slow" advTm="3000"/>
     </mc:Fallback>
   </mc:AlternateContent>
@@ -10915,7 +10915,7 @@
                 <a:latin typeface="Helvetica Neue"/>
                 <a:cs typeface="Helvetica Neue"/>
               </a:rPr>
-              <a:t>172.16.1.0/30</a:t>
+              <a:t>100.1.11.0/30</a:t>
             </a:r>
           </a:p>
         </p:txBody>
@@ -11122,7 +11122,7 @@
         <p:spPr>
           <a:xfrm rot="19613323">
             <a:off x="7518829" y="3125422"/>
-            <a:ext cx="896400" cy="369332"/>
+            <a:ext cx="896399" cy="369332"/>
           </a:xfrm>
           <a:prstGeom prst="rect">
             <a:avLst/>
@@ -11162,7 +11162,7 @@
                 <a:latin typeface="Helvetica Neue"/>
                 <a:cs typeface="Helvetica Neue"/>
               </a:rPr>
-              <a:t>172.16.2.0/30</a:t>
+              <a:t>100.2.11.0/30</a:t>
             </a:r>
           </a:p>
         </p:txBody>
@@ -13086,11 +13086,11 @@
   <p:clrMapOvr>
     <a:masterClrMapping/>
   </p:clrMapOvr>
-  <mc:AlternateContent xmlns:mc="http://schemas.openxmlformats.org/markup-compatibility/2006">
-    <mc:Choice xmlns:p14="http://schemas.microsoft.com/office/powerpoint/2010/main" Requires="p14">
+  <mc:AlternateContent xmlns:mc="http://schemas.openxmlformats.org/markup-compatibility/2006" xmlns:p14="http://schemas.microsoft.com/office/powerpoint/2010/main">
+    <mc:Choice Requires="p14">
       <p:transition spd="slow" p14:dur="2000" advTm="3000"/>
     </mc:Choice>
-    <mc:Fallback>
+    <mc:Fallback xmlns="">
       <p:transition spd="slow" advTm="3000"/>
     </mc:Fallback>
   </mc:AlternateContent>
@@ -13339,11 +13339,11 @@
   <p:clrMapOvr>
     <a:masterClrMapping/>
   </p:clrMapOvr>
-  <mc:AlternateContent xmlns:mc="http://schemas.openxmlformats.org/markup-compatibility/2006">
-    <mc:Choice xmlns:p14="http://schemas.microsoft.com/office/powerpoint/2010/main" Requires="p14">
+  <mc:AlternateContent xmlns:mc="http://schemas.openxmlformats.org/markup-compatibility/2006" xmlns:p14="http://schemas.microsoft.com/office/powerpoint/2010/main">
+    <mc:Choice Requires="p14">
       <p:transition spd="slow" p14:dur="2000" advTm="3000"/>
     </mc:Choice>
-    <mc:Fallback>
+    <mc:Fallback xmlns="">
       <p:transition spd="slow" advTm="3000"/>
     </mc:Fallback>
   </mc:AlternateContent>

</xml_diff>